<commit_message>
added ping module : mapper2.cpp
</commit_message>
<xml_diff>
--- a/docs/project-presentation.pptx
+++ b/docs/project-presentation.pptx
@@ -29,7 +29,6 @@
     <p:sldId id="273" r:id="rId24"/>
     <p:sldId id="274" r:id="rId25"/>
     <p:sldId id="275" r:id="rId26"/>
-    <p:sldId id="276" r:id="rId27"/>
   </p:sldIdLst>
   <p:sldSz cx="9144000" cy="6858000"/>
   <p:notesSz cx="7559675" cy="10691812"/>
@@ -5863,7 +5862,7 @@
         <p:spPr>
           <a:xfrm>
             <a:off x="457200" y="273600"/>
-            <a:ext cx="8228880" cy="1144800"/>
+            <a:ext cx="8229240" cy="1144800"/>
           </a:xfrm>
           <a:prstGeom prst="rect">
             <a:avLst/>
@@ -5872,6 +5871,7 @@
         <p:txBody>
           <a:bodyPr wrap="none" lIns="0" rIns="0" tIns="0" bIns="0" anchor="ctr"/>
           <a:p>
+            <a:pPr algn="ctr"/>
             <a:r>
               <a:rPr lang="en-IN"/>
               <a:t>Click to edit the title text format</a:t>
@@ -5893,7 +5893,7 @@
         <p:spPr>
           <a:xfrm>
             <a:off x="457200" y="1604520"/>
-            <a:ext cx="8228880" cy="3976560"/>
+            <a:ext cx="8229240" cy="3976920"/>
           </a:xfrm>
           <a:prstGeom prst="rect">
             <a:avLst/>
@@ -6761,7 +6761,7 @@
         <p:spPr>
           <a:xfrm>
             <a:off x="864000" y="258480"/>
-            <a:ext cx="7771320" cy="1468800"/>
+            <a:ext cx="7770960" cy="1468440"/>
           </a:xfrm>
           <a:prstGeom prst="rect">
             <a:avLst/>
@@ -6808,7 +6808,7 @@
         <p:spPr>
           <a:xfrm>
             <a:off x="288000" y="4680000"/>
-            <a:ext cx="6399720" cy="2015280"/>
+            <a:ext cx="6399360" cy="2014920"/>
           </a:xfrm>
           <a:prstGeom prst="rect">
             <a:avLst/>
@@ -6862,7 +6862,7 @@
         <p:spPr>
           <a:xfrm>
             <a:off x="5760000" y="4583880"/>
-            <a:ext cx="6399720" cy="1751400"/>
+            <a:ext cx="6399360" cy="1751040"/>
           </a:xfrm>
           <a:prstGeom prst="rect">
             <a:avLst/>
@@ -6920,7 +6920,7 @@
         <p:spPr>
           <a:xfrm>
             <a:off x="1440000" y="2160000"/>
-            <a:ext cx="6399720" cy="1751400"/>
+            <a:ext cx="6399360" cy="1751040"/>
           </a:xfrm>
           <a:prstGeom prst="rect">
             <a:avLst/>
@@ -7004,7 +7004,7 @@
         <p:spPr>
           <a:xfrm>
             <a:off x="457200" y="274680"/>
-            <a:ext cx="8227440" cy="1140840"/>
+            <a:ext cx="8227080" cy="1140480"/>
           </a:xfrm>
           <a:prstGeom prst="rect">
             <a:avLst/>
@@ -7044,7 +7044,7 @@
         <p:spPr>
           <a:xfrm>
             <a:off x="457200" y="1600200"/>
-            <a:ext cx="8227440" cy="4523760"/>
+            <a:ext cx="8227080" cy="4523400"/>
           </a:xfrm>
           <a:prstGeom prst="rect">
             <a:avLst/>
@@ -7327,7 +7327,7 @@
         <p:spPr>
           <a:xfrm>
             <a:off x="457200" y="274680"/>
-            <a:ext cx="8227440" cy="1140840"/>
+            <a:ext cx="8227080" cy="1140480"/>
           </a:xfrm>
           <a:prstGeom prst="rect">
             <a:avLst/>
@@ -7367,7 +7367,7 @@
         <p:spPr>
           <a:xfrm>
             <a:off x="457200" y="1600200"/>
-            <a:ext cx="8227440" cy="4523760"/>
+            <a:ext cx="8227080" cy="4523400"/>
           </a:xfrm>
           <a:prstGeom prst="rect">
             <a:avLst/>
@@ -7493,7 +7493,7 @@
         <p:spPr>
           <a:xfrm>
             <a:off x="457200" y="274680"/>
-            <a:ext cx="8227440" cy="1140840"/>
+            <a:ext cx="8227080" cy="1140480"/>
           </a:xfrm>
           <a:prstGeom prst="rect">
             <a:avLst/>
@@ -7533,7 +7533,7 @@
         <p:spPr>
           <a:xfrm>
             <a:off x="457200" y="1600200"/>
-            <a:ext cx="8227440" cy="4523760"/>
+            <a:ext cx="8227080" cy="4523400"/>
           </a:xfrm>
           <a:prstGeom prst="rect">
             <a:avLst/>
@@ -7670,7 +7670,7 @@
         <p:spPr>
           <a:xfrm>
             <a:off x="457200" y="274680"/>
-            <a:ext cx="8227440" cy="1140840"/>
+            <a:ext cx="8227080" cy="1140480"/>
           </a:xfrm>
           <a:prstGeom prst="rect">
             <a:avLst/>
@@ -7710,7 +7710,7 @@
         <p:spPr>
           <a:xfrm>
             <a:off x="457200" y="1600200"/>
-            <a:ext cx="8227440" cy="4523760"/>
+            <a:ext cx="8227080" cy="4523400"/>
           </a:xfrm>
           <a:prstGeom prst="rect">
             <a:avLst/>
@@ -8047,7 +8047,7 @@
         <p:spPr>
           <a:xfrm>
             <a:off x="456480" y="504000"/>
-            <a:ext cx="8326080" cy="7968600"/>
+            <a:ext cx="8325720" cy="7968240"/>
           </a:xfrm>
           <a:prstGeom prst="rect">
             <a:avLst/>
@@ -8456,7 +8456,7 @@
         <p:spPr>
           <a:xfrm>
             <a:off x="0" y="70200"/>
-            <a:ext cx="9142560" cy="5472360"/>
+            <a:ext cx="9142200" cy="5472000"/>
           </a:xfrm>
           <a:prstGeom prst="rect">
             <a:avLst/>
@@ -8831,7 +8831,7 @@
         <p:spPr>
           <a:xfrm>
             <a:off x="504000" y="360000"/>
-            <a:ext cx="8228880" cy="1142280"/>
+            <a:ext cx="8228520" cy="1141920"/>
           </a:xfrm>
           <a:prstGeom prst="rect">
             <a:avLst/>
@@ -8844,7 +8844,11 @@
         <p:txBody>
           <a:bodyPr wrap="none" lIns="0" rIns="0" tIns="0" bIns="0" anchor="ctr"/>
           <a:p>
-            <a:pPr algn="ctr"/>
+            <a:pPr algn="ctr">
+              <a:lnSpc>
+                <a:spcPct val="100000"/>
+              </a:lnSpc>
+            </a:pPr>
             <a:r>
               <a:rPr b="1" lang="en-IN" sz="3200"/>
               <a:t>Our Solution</a:t>
@@ -8862,7 +8866,7 @@
         <p:spPr>
           <a:xfrm>
             <a:off x="410760" y="2169360"/>
-            <a:ext cx="7796880" cy="3302280"/>
+            <a:ext cx="7796520" cy="3301920"/>
           </a:xfrm>
           <a:prstGeom prst="rect">
             <a:avLst/>
@@ -8882,7 +8886,7 @@
         <p:spPr>
           <a:xfrm>
             <a:off x="457560" y="1600560"/>
-            <a:ext cx="8228880" cy="4525200"/>
+            <a:ext cx="8228520" cy="4524840"/>
           </a:xfrm>
           <a:prstGeom prst="rect">
             <a:avLst/>
@@ -9057,7 +9061,7 @@
         <p:spPr>
           <a:xfrm>
             <a:off x="457200" y="274680"/>
-            <a:ext cx="8228520" cy="1141920"/>
+            <a:ext cx="8228160" cy="1141560"/>
           </a:xfrm>
           <a:prstGeom prst="rect">
             <a:avLst/>
@@ -9098,7 +9102,7 @@
         <p:spPr>
           <a:xfrm>
             <a:off x="1080000" y="1368000"/>
-            <a:ext cx="7055280" cy="5255280"/>
+            <a:ext cx="7054920" cy="5254920"/>
           </a:xfrm>
           <a:prstGeom prst="rect">
             <a:avLst/>
@@ -9123,7 +9127,7 @@
         <p:spPr>
           <a:xfrm>
             <a:off x="4781880" y="2736000"/>
-            <a:ext cx="329400" cy="359280"/>
+            <a:ext cx="329040" cy="358920"/>
           </a:xfrm>
           <a:prstGeom prst="rect">
             <a:avLst/>
@@ -9148,7 +9152,7 @@
         <p:spPr>
           <a:xfrm>
             <a:off x="2333880" y="4680000"/>
-            <a:ext cx="329400" cy="359280"/>
+            <a:ext cx="329040" cy="358920"/>
           </a:xfrm>
           <a:prstGeom prst="rect">
             <a:avLst/>
@@ -9173,7 +9177,7 @@
         <p:spPr>
           <a:xfrm>
             <a:off x="3989880" y="4176000"/>
-            <a:ext cx="329400" cy="359280"/>
+            <a:ext cx="329040" cy="358920"/>
           </a:xfrm>
           <a:prstGeom prst="rect">
             <a:avLst/>
@@ -9198,7 +9202,7 @@
         <p:spPr>
           <a:xfrm>
             <a:off x="5256000" y="3888000"/>
-            <a:ext cx="329400" cy="359280"/>
+            <a:ext cx="329040" cy="358920"/>
           </a:xfrm>
           <a:prstGeom prst="rect">
             <a:avLst/>
@@ -9223,7 +9227,7 @@
         <p:spPr>
           <a:xfrm>
             <a:off x="6581880" y="4680000"/>
-            <a:ext cx="329400" cy="359280"/>
+            <a:ext cx="329040" cy="358920"/>
           </a:xfrm>
           <a:prstGeom prst="rect">
             <a:avLst/>
@@ -9291,7 +9295,7 @@
         <p:spPr>
           <a:xfrm>
             <a:off x="457560" y="274680"/>
-            <a:ext cx="8228520" cy="1141920"/>
+            <a:ext cx="8228160" cy="1141560"/>
           </a:xfrm>
           <a:prstGeom prst="rect">
             <a:avLst/>
@@ -9332,7 +9336,7 @@
         <p:spPr>
           <a:xfrm>
             <a:off x="864000" y="1380960"/>
-            <a:ext cx="7403040" cy="5026320"/>
+            <a:ext cx="7402680" cy="5025960"/>
           </a:xfrm>
           <a:prstGeom prst="rect">
             <a:avLst/>
@@ -9357,7 +9361,7 @@
         <p:spPr>
           <a:xfrm>
             <a:off x="5688000" y="2808000"/>
-            <a:ext cx="329400" cy="359280"/>
+            <a:ext cx="329040" cy="358920"/>
           </a:xfrm>
           <a:prstGeom prst="rect">
             <a:avLst/>
@@ -9382,7 +9386,7 @@
         <p:spPr>
           <a:xfrm>
             <a:off x="4565880" y="4320000"/>
-            <a:ext cx="329400" cy="359280"/>
+            <a:ext cx="329040" cy="358920"/>
           </a:xfrm>
           <a:prstGeom prst="rect">
             <a:avLst/>
@@ -9407,7 +9411,7 @@
         <p:spPr>
           <a:xfrm>
             <a:off x="2592000" y="4896000"/>
-            <a:ext cx="329400" cy="359280"/>
+            <a:ext cx="329040" cy="358920"/>
           </a:xfrm>
           <a:prstGeom prst="rect">
             <a:avLst/>
@@ -9466,9 +9470,64 @@
           <a:chExt cx="0" cy="0"/>
         </a:xfrm>
       </p:grpSpPr>
+      <p:sp>
+        <p:nvSpPr>
+          <p:cNvPr id="226" name="CustomShape 1"/>
+          <p:cNvSpPr/>
+          <p:nvPr/>
+        </p:nvSpPr>
+        <p:spPr>
+          <a:xfrm>
+            <a:off x="432000" y="216000"/>
+            <a:ext cx="8228160" cy="1141560"/>
+          </a:xfrm>
+          <a:prstGeom prst="rect">
+            <a:avLst/>
+          </a:prstGeom>
+          <a:noFill/>
+          <a:ln>
+            <a:noFill/>
+          </a:ln>
+        </p:spPr>
+        <p:txBody>
+          <a:bodyPr wrap="none" lIns="0" rIns="0" tIns="0" bIns="0" anchor="ctr"/>
+          <a:p>
+            <a:pPr algn="ctr">
+              <a:lnSpc>
+                <a:spcPct val="100000"/>
+              </a:lnSpc>
+            </a:pPr>
+            <a:r>
+              <a:rPr lang="en-IN" sz="2400"/>
+              <a:t>Version Control – Github</a:t>
+            </a:r>
+            <a:endParaRPr/>
+          </a:p>
+          <a:p>
+            <a:pPr algn="ctr">
+              <a:lnSpc>
+                <a:spcPct val="100000"/>
+              </a:lnSpc>
+            </a:pPr>
+            <a:endParaRPr/>
+          </a:p>
+          <a:p>
+            <a:pPr algn="ctr">
+              <a:lnSpc>
+                <a:spcPct val="100000"/>
+              </a:lnSpc>
+            </a:pPr>
+            <a:r>
+              <a:rPr lang="en-IN" sz="2200"/>
+              <a:t>https://github.com/sourabh14/network-mapper</a:t>
+            </a:r>
+            <a:endParaRPr/>
+          </a:p>
+        </p:txBody>
+      </p:sp>
       <p:pic>
         <p:nvPicPr>
-          <p:cNvPr id="226" name="" descr=""/>
+          <p:cNvPr id="227" name="" descr=""/>
           <p:cNvPicPr/>
           <p:nvPr/>
         </p:nvPicPr>
@@ -9480,8 +9539,8 @@
         </p:blipFill>
         <p:spPr>
           <a:xfrm>
-            <a:off x="500760" y="1193760"/>
-            <a:ext cx="8402040" cy="5219640"/>
+            <a:off x="72360" y="1656000"/>
+            <a:ext cx="8782560" cy="4822920"/>
           </a:xfrm>
           <a:prstGeom prst="rect">
             <a:avLst/>
@@ -9491,37 +9550,6 @@
           </a:ln>
         </p:spPr>
       </p:pic>
-      <p:sp>
-        <p:nvSpPr>
-          <p:cNvPr id="227" name="TextShape 1"/>
-          <p:cNvSpPr txBox="1"/>
-          <p:nvPr/>
-        </p:nvSpPr>
-        <p:spPr>
-          <a:xfrm>
-            <a:off x="2159280" y="361800"/>
-            <a:ext cx="5435280" cy="546480"/>
-          </a:xfrm>
-          <a:prstGeom prst="rect">
-            <a:avLst/>
-          </a:prstGeom>
-        </p:spPr>
-        <p:txBody>
-          <a:bodyPr wrap="none" lIns="90000" rIns="90000" tIns="45000" bIns="45000"/>
-          <a:p>
-            <a:pPr algn="ctr">
-              <a:lnSpc>
-                <a:spcPct val="100000"/>
-              </a:lnSpc>
-            </a:pPr>
-            <a:r>
-              <a:rPr lang="en-IN" sz="3200"/>
-              <a:t>Architecture diagram</a:t>
-            </a:r>
-            <a:endParaRPr/>
-          </a:p>
-        </p:txBody>
-      </p:sp>
     </p:spTree>
   </p:cSld>
   <p:timing>
@@ -9580,7 +9608,7 @@
         <p:spPr>
           <a:xfrm>
             <a:off x="864000" y="-144000"/>
-            <a:ext cx="7771320" cy="1468800"/>
+            <a:ext cx="7770960" cy="1468440"/>
           </a:xfrm>
           <a:prstGeom prst="rect">
             <a:avLst/>
@@ -9615,7 +9643,7 @@
         <p:spPr>
           <a:xfrm>
             <a:off x="432000" y="792000"/>
-            <a:ext cx="8588520" cy="5543280"/>
+            <a:ext cx="8588160" cy="5542920"/>
           </a:xfrm>
           <a:prstGeom prst="rect">
             <a:avLst/>
@@ -10007,8 +10035,8 @@
         </p:nvSpPr>
         <p:spPr>
           <a:xfrm>
-            <a:off x="432000" y="216000"/>
-            <a:ext cx="8228520" cy="1141920"/>
+            <a:off x="504000" y="2745360"/>
+            <a:ext cx="8228160" cy="1141560"/>
           </a:xfrm>
           <a:prstGeom prst="rect">
             <a:avLst/>
@@ -10027,58 +10055,13 @@
               </a:lnSpc>
             </a:pPr>
             <a:r>
-              <a:rPr lang="en-IN" sz="2400"/>
-              <a:t>Version Control – Github</a:t>
-            </a:r>
-            <a:endParaRPr/>
-          </a:p>
-          <a:p>
-            <a:pPr algn="ctr">
-              <a:lnSpc>
-                <a:spcPct val="100000"/>
-              </a:lnSpc>
-            </a:pPr>
-            <a:endParaRPr/>
-          </a:p>
-          <a:p>
-            <a:pPr algn="ctr">
-              <a:lnSpc>
-                <a:spcPct val="100000"/>
-              </a:lnSpc>
-            </a:pPr>
-            <a:r>
-              <a:rPr lang="en-IN" sz="2200"/>
-              <a:t>https://github.com/sourabh14/network-mapper</a:t>
-            </a:r>
-            <a:endParaRPr/>
-          </a:p>
-        </p:txBody>
-      </p:sp>
-      <p:pic>
-        <p:nvPicPr>
-          <p:cNvPr id="229" name="" descr=""/>
-          <p:cNvPicPr/>
-          <p:nvPr/>
-        </p:nvPicPr>
-        <p:blipFill>
-          <a:blip r:embed="rId1"/>
-          <a:stretch>
-            <a:fillRect/>
-          </a:stretch>
-        </p:blipFill>
-        <p:spPr>
-          <a:xfrm>
-            <a:off x="72360" y="1656000"/>
-            <a:ext cx="8782920" cy="4823280"/>
-          </a:xfrm>
-          <a:prstGeom prst="rect">
-            <a:avLst/>
-          </a:prstGeom>
-          <a:ln>
-            <a:noFill/>
-          </a:ln>
-        </p:spPr>
-      </p:pic>
+              <a:rPr lang="en-IN" sz="3200"/>
+              <a:t>Thank You</a:t>
+            </a:r>
+            <a:endParaRPr/>
+          </a:p>
+        </p:txBody>
+      </p:sp>
     </p:spTree>
   </p:cSld>
   <p:timing>
@@ -10088,90 +10071,6 @@
           <p:childTnLst>
             <p:seq>
               <p:cTn id="40" nodeType="mainSeq"/>
-              <p:prevCondLst>
-                <p:cond delay="0" evt="onPrev">
-                  <p:tgtEl>
-                    <p:sldTgt/>
-                  </p:tgtEl>
-                </p:cond>
-              </p:prevCondLst>
-              <p:nextCondLst>
-                <p:cond delay="0" evt="onNext">
-                  <p:tgtEl>
-                    <p:sldTgt/>
-                  </p:tgtEl>
-                </p:cond>
-              </p:nextCondLst>
-            </p:seq>
-          </p:childTnLst>
-        </p:cTn>
-      </p:par>
-    </p:tnLst>
-  </p:timing>
-</p:sld>
-</file>
-
-<file path=ppt/slides/slide21.xml><?xml version="1.0" encoding="utf-8"?>
-<p:sld xmlns:a="http://schemas.openxmlformats.org/drawingml/2006/main" xmlns:p="http://schemas.openxmlformats.org/presentationml/2006/main" xmlns:r="http://schemas.openxmlformats.org/officeDocument/2006/relationships">
-  <p:cSld>
-    <p:spTree>
-      <p:nvGrpSpPr>
-        <p:cNvPr id="1" name=""/>
-        <p:cNvGrpSpPr/>
-        <p:nvPr/>
-      </p:nvGrpSpPr>
-      <p:grpSpPr>
-        <a:xfrm>
-          <a:off x="0" y="0"/>
-          <a:ext cx="0" cy="0"/>
-          <a:chOff x="0" y="0"/>
-          <a:chExt cx="0" cy="0"/>
-        </a:xfrm>
-      </p:grpSpPr>
-      <p:sp>
-        <p:nvSpPr>
-          <p:cNvPr id="230" name="CustomShape 1"/>
-          <p:cNvSpPr/>
-          <p:nvPr/>
-        </p:nvSpPr>
-        <p:spPr>
-          <a:xfrm>
-            <a:off x="504000" y="2745360"/>
-            <a:ext cx="8228520" cy="1141920"/>
-          </a:xfrm>
-          <a:prstGeom prst="rect">
-            <a:avLst/>
-          </a:prstGeom>
-          <a:noFill/>
-          <a:ln>
-            <a:noFill/>
-          </a:ln>
-        </p:spPr>
-        <p:txBody>
-          <a:bodyPr wrap="none" lIns="0" rIns="0" tIns="0" bIns="0" anchor="ctr"/>
-          <a:p>
-            <a:pPr algn="ctr">
-              <a:lnSpc>
-                <a:spcPct val="100000"/>
-              </a:lnSpc>
-            </a:pPr>
-            <a:r>
-              <a:rPr lang="en-IN" sz="3200"/>
-              <a:t>Thank You</a:t>
-            </a:r>
-            <a:endParaRPr/>
-          </a:p>
-        </p:txBody>
-      </p:sp>
-    </p:spTree>
-  </p:cSld>
-  <p:timing>
-    <p:tnLst>
-      <p:par>
-        <p:cTn id="41" dur="indefinite" restart="never" nodeType="tmRoot">
-          <p:childTnLst>
-            <p:seq>
-              <p:cTn id="42" nodeType="mainSeq"/>
               <p:prevCondLst>
                 <p:cond delay="0" evt="onPrev">
                   <p:tgtEl>
@@ -10221,7 +10120,7 @@
         <p:spPr>
           <a:xfrm>
             <a:off x="457200" y="274680"/>
-            <a:ext cx="8227440" cy="1140840"/>
+            <a:ext cx="8227080" cy="1140480"/>
           </a:xfrm>
           <a:prstGeom prst="rect">
             <a:avLst/>
@@ -10261,7 +10160,7 @@
         <p:spPr>
           <a:xfrm>
             <a:off x="457200" y="1600200"/>
-            <a:ext cx="8227440" cy="4523760"/>
+            <a:ext cx="8227080" cy="4523400"/>
           </a:xfrm>
           <a:prstGeom prst="rect">
             <a:avLst/>
@@ -10309,7 +10208,7 @@
         <p:spPr>
           <a:xfrm>
             <a:off x="1371600" y="3657600"/>
-            <a:ext cx="5379120" cy="2969640"/>
+            <a:ext cx="5378760" cy="2969280"/>
           </a:xfrm>
           <a:prstGeom prst="rect">
             <a:avLst/>
@@ -10377,7 +10276,7 @@
         <p:spPr>
           <a:xfrm>
             <a:off x="457200" y="274680"/>
-            <a:ext cx="8227440" cy="1140840"/>
+            <a:ext cx="8227080" cy="1140480"/>
           </a:xfrm>
           <a:prstGeom prst="rect">
             <a:avLst/>
@@ -10417,7 +10316,7 @@
         <p:spPr>
           <a:xfrm>
             <a:off x="457200" y="1600200"/>
-            <a:ext cx="8227440" cy="4523760"/>
+            <a:ext cx="8227080" cy="4523400"/>
           </a:xfrm>
           <a:prstGeom prst="rect">
             <a:avLst/>
@@ -10527,7 +10426,7 @@
         <p:spPr>
           <a:xfrm>
             <a:off x="457200" y="274680"/>
-            <a:ext cx="8227440" cy="1140840"/>
+            <a:ext cx="8227080" cy="1140480"/>
           </a:xfrm>
           <a:prstGeom prst="rect">
             <a:avLst/>
@@ -10567,7 +10466,7 @@
         <p:spPr>
           <a:xfrm>
             <a:off x="457200" y="1600200"/>
-            <a:ext cx="8227440" cy="4523760"/>
+            <a:ext cx="8227080" cy="4523400"/>
           </a:xfrm>
           <a:prstGeom prst="rect">
             <a:avLst/>
@@ -10723,7 +10622,7 @@
         <p:spPr>
           <a:xfrm>
             <a:off x="457200" y="274680"/>
-            <a:ext cx="8227440" cy="1140840"/>
+            <a:ext cx="8227080" cy="1140480"/>
           </a:xfrm>
           <a:prstGeom prst="rect">
             <a:avLst/>
@@ -10763,7 +10662,7 @@
         <p:spPr>
           <a:xfrm>
             <a:off x="457200" y="1600200"/>
-            <a:ext cx="8227440" cy="4523760"/>
+            <a:ext cx="8227080" cy="4523400"/>
           </a:xfrm>
           <a:prstGeom prst="rect">
             <a:avLst/>
@@ -10962,7 +10861,7 @@
         <p:spPr>
           <a:xfrm>
             <a:off x="457200" y="274680"/>
-            <a:ext cx="8227440" cy="1140840"/>
+            <a:ext cx="8227080" cy="1140480"/>
           </a:xfrm>
           <a:prstGeom prst="rect">
             <a:avLst/>
@@ -11002,7 +10901,7 @@
         <p:spPr>
           <a:xfrm>
             <a:off x="457200" y="1600200"/>
-            <a:ext cx="8227440" cy="4523760"/>
+            <a:ext cx="8227080" cy="4523400"/>
           </a:xfrm>
           <a:prstGeom prst="rect">
             <a:avLst/>
@@ -11198,7 +11097,7 @@
         <p:spPr>
           <a:xfrm>
             <a:off x="457200" y="274680"/>
-            <a:ext cx="8227440" cy="1140840"/>
+            <a:ext cx="8227080" cy="1140480"/>
           </a:xfrm>
           <a:prstGeom prst="rect">
             <a:avLst/>
@@ -11238,7 +11137,7 @@
         <p:spPr>
           <a:xfrm>
             <a:off x="457200" y="1600200"/>
-            <a:ext cx="8227440" cy="4523760"/>
+            <a:ext cx="8227080" cy="4523400"/>
           </a:xfrm>
           <a:prstGeom prst="rect">
             <a:avLst/>
@@ -11455,7 +11354,7 @@
         <p:spPr>
           <a:xfrm>
             <a:off x="457200" y="274680"/>
-            <a:ext cx="8227440" cy="1140840"/>
+            <a:ext cx="8227080" cy="1140480"/>
           </a:xfrm>
           <a:prstGeom prst="rect">
             <a:avLst/>
@@ -11495,7 +11394,7 @@
         <p:spPr>
           <a:xfrm>
             <a:off x="457200" y="1600200"/>
-            <a:ext cx="8227440" cy="4523760"/>
+            <a:ext cx="8227080" cy="4523400"/>
           </a:xfrm>
           <a:prstGeom prst="rect">
             <a:avLst/>

</xml_diff>